<commit_message>
historia + setInterval e setTimeout
</commit_message>
<xml_diff>
--- a/BASKA’s CLUB.pptx
+++ b/BASKA’s CLUB.pptx
@@ -12,11 +12,11 @@
   </p:handoutMasterIdLst>
   <p:sldIdLst>
     <p:sldId id="257" r:id="rId5"/>
-    <p:sldId id="265" r:id="rId6"/>
+    <p:sldId id="268" r:id="rId6"/>
     <p:sldId id="266" r:id="rId7"/>
     <p:sldId id="264" r:id="rId8"/>
     <p:sldId id="267" r:id="rId9"/>
-    <p:sldId id="268" r:id="rId10"/>
+    <p:sldId id="265" r:id="rId10"/>
     <p:sldId id="269" r:id="rId11"/>
     <p:sldId id="270" r:id="rId12"/>
     <p:sldId id="271" r:id="rId13"/>
@@ -1306,7 +1306,7 @@
             <a:pPr rtl="0"/>
             <a:fld id="{F5A84665-28CF-4737-92F4-1C720A21C271}" type="datetime1">
               <a:rPr lang="pt-BR" smtClean="0"/>
-              <a:t>02/06/2022</a:t>
+              <a:t>04/06/2022</a:t>
             </a:fld>
             <a:endParaRPr lang="pt-BR" dirty="0"/>
           </a:p>
@@ -1476,7 +1476,7 @@
             <a:pPr rtl="0"/>
             <a:fld id="{8F9645D9-8D82-4420-B4D8-436117D73973}" type="datetime1">
               <a:rPr lang="pt-BR" smtClean="0"/>
-              <a:t>02/06/2022</a:t>
+              <a:t>04/06/2022</a:t>
             </a:fld>
             <a:endParaRPr lang="pt-BR" dirty="0"/>
           </a:p>
@@ -1907,7 +1907,7 @@
     </p:spTree>
     <p:extLst>
       <p:ext uri="{BB962C8B-B14F-4D97-AF65-F5344CB8AC3E}">
-        <p14:creationId xmlns:p14="http://schemas.microsoft.com/office/powerpoint/2010/main" val="3883378981"/>
+        <p14:creationId xmlns:p14="http://schemas.microsoft.com/office/powerpoint/2010/main" val="4056213686"/>
       </p:ext>
     </p:extLst>
   </p:cSld>
@@ -2247,7 +2247,7 @@
     </p:spTree>
     <p:extLst>
       <p:ext uri="{BB962C8B-B14F-4D97-AF65-F5344CB8AC3E}">
-        <p14:creationId xmlns:p14="http://schemas.microsoft.com/office/powerpoint/2010/main" val="4056213686"/>
+        <p14:creationId xmlns:p14="http://schemas.microsoft.com/office/powerpoint/2010/main" val="3883378981"/>
       </p:ext>
     </p:extLst>
   </p:cSld>
@@ -2813,7 +2813,7 @@
             <a:pPr rtl="0"/>
             <a:fld id="{C9CEBCC8-FAC6-4131-8C06-57003D426C3B}" type="datetime1">
               <a:rPr lang="pt-BR" smtClean="0"/>
-              <a:t>02/06/2022</a:t>
+              <a:t>04/06/2022</a:t>
             </a:fld>
             <a:endParaRPr lang="pt-BR" dirty="0"/>
           </a:p>
@@ -3012,7 +3012,7 @@
             <a:pPr rtl="0"/>
             <a:fld id="{5C659383-BE4F-491F-B54C-FD17BEC6C108}" type="datetime1">
               <a:rPr lang="pt-BR" smtClean="0"/>
-              <a:t>02/06/2022</a:t>
+              <a:t>04/06/2022</a:t>
             </a:fld>
             <a:endParaRPr lang="pt-BR" dirty="0"/>
           </a:p>
@@ -3201,7 +3201,7 @@
             <a:pPr rtl="0"/>
             <a:fld id="{B11A4DB9-9B3F-4904-9B0D-9B81C2A2C1FE}" type="datetime1">
               <a:rPr lang="pt-BR" smtClean="0"/>
-              <a:t>02/06/2022</a:t>
+              <a:t>04/06/2022</a:t>
             </a:fld>
             <a:endParaRPr lang="pt-BR" dirty="0"/>
           </a:p>
@@ -3471,7 +3471,7 @@
             <a:pPr rtl="0"/>
             <a:fld id="{A1F1BCB2-D85C-48E8-B2C5-A59E1B76D155}" type="datetime1">
               <a:rPr lang="pt-BR" smtClean="0"/>
-              <a:t>02/06/2022</a:t>
+              <a:t>04/06/2022</a:t>
             </a:fld>
             <a:endParaRPr lang="pt-BR" dirty="0"/>
           </a:p>
@@ -3722,7 +3722,7 @@
             <a:pPr rtl="0"/>
             <a:fld id="{6F74A3A0-E45A-4F4C-87C9-94CC08A85BF0}" type="datetime1">
               <a:rPr lang="pt-BR" smtClean="0"/>
-              <a:t>02/06/2022</a:t>
+              <a:t>04/06/2022</a:t>
             </a:fld>
             <a:endParaRPr lang="pt-BR" dirty="0"/>
           </a:p>
@@ -4117,7 +4117,7 @@
             <a:pPr rtl="0"/>
             <a:fld id="{3FB011F4-196C-45E0-8C40-7C1FF5EA4F7E}" type="datetime1">
               <a:rPr lang="pt-BR" smtClean="0"/>
-              <a:t>02/06/2022</a:t>
+              <a:t>04/06/2022</a:t>
             </a:fld>
             <a:endParaRPr lang="pt-BR" dirty="0"/>
           </a:p>
@@ -4254,7 +4254,7 @@
             <a:pPr rtl="0"/>
             <a:fld id="{9DE35D2B-71E5-40D7-96E0-4BC7F907BEB3}" type="datetime1">
               <a:rPr lang="pt-BR" smtClean="0"/>
-              <a:t>02/06/2022</a:t>
+              <a:t>04/06/2022</a:t>
             </a:fld>
             <a:endParaRPr lang="pt-BR" dirty="0"/>
           </a:p>
@@ -4367,7 +4367,7 @@
             <a:pPr rtl="0"/>
             <a:fld id="{7666A155-1DFE-40B5-84E7-D9810E93BC44}" type="datetime1">
               <a:rPr lang="pt-BR" smtClean="0"/>
-              <a:t>02/06/2022</a:t>
+              <a:t>04/06/2022</a:t>
             </a:fld>
             <a:endParaRPr lang="pt-BR" dirty="0"/>
           </a:p>
@@ -5172,7 +5172,7 @@
             <a:pPr rtl="0"/>
             <a:fld id="{EF93C091-FF09-4AAB-A579-05AFB545AA39}" type="datetime1">
               <a:rPr lang="pt-BR" smtClean="0"/>
-              <a:t>02/06/2022</a:t>
+              <a:t>04/06/2022</a:t>
             </a:fld>
             <a:endParaRPr lang="pt-BR" dirty="0"/>
           </a:p>
@@ -5590,11 +5590,11 @@
           <a:p>
             <a:pPr rtl="0"/>
             <a:r>
-              <a:rPr lang="pt-BR" dirty="0" err="1"/>
+              <a:rPr lang="pt-BR" sz="6000" dirty="0" err="1"/>
               <a:t>BASKA’s</a:t>
             </a:r>
             <a:r>
-              <a:rPr lang="pt-BR" dirty="0"/>
+              <a:rPr lang="pt-BR" sz="6000" dirty="0"/>
               <a:t> CLUB</a:t>
             </a:r>
           </a:p>
@@ -5612,13 +5612,23 @@
         </p:nvSpPr>
         <p:spPr/>
         <p:txBody>
-          <a:bodyPr rtlCol="0"/>
+          <a:bodyPr rtlCol="0">
+            <a:normAutofit/>
+          </a:bodyPr>
           <a:lstStyle/>
           <a:p>
             <a:pPr rtl="0"/>
             <a:r>
-              <a:rPr lang="pt-BR" dirty="0"/>
-              <a:t>Projeto Individual</a:t>
+              <a:rPr lang="pt-BR" sz="2800" dirty="0"/>
+              <a:t>Miguel de </a:t>
+            </a:r>
+            <a:r>
+              <a:rPr lang="pt-BR" sz="2800" dirty="0" err="1"/>
+              <a:t>Araujo</a:t>
+            </a:r>
+            <a:r>
+              <a:rPr lang="pt-BR" sz="2800" dirty="0"/>
+              <a:t> Molina – 1ADS-B</a:t>
             </a:r>
           </a:p>
         </p:txBody>
@@ -5675,39 +5685,24 @@
             <p:ph type="title"/>
           </p:nvPr>
         </p:nvSpPr>
-        <p:spPr/>
+        <p:spPr>
+          <a:xfrm>
+            <a:off x="1038137" y="332656"/>
+            <a:ext cx="10058400" cy="1195198"/>
+          </a:xfrm>
+        </p:spPr>
         <p:txBody>
           <a:bodyPr rtlCol="0"/>
           <a:lstStyle/>
           <a:p>
             <a:pPr rtl="0"/>
-            <a:endParaRPr lang="pt-BR" dirty="0"/>
-          </a:p>
-        </p:txBody>
-      </p:sp>
-      <p:pic>
-        <p:nvPicPr>
-          <p:cNvPr id="5" name="Espaço reservado para imagem 4" descr="Jogadores de basquete levantando as mãos juntos"/>
-          <p:cNvPicPr>
-            <a:picLocks noGrp="1" noChangeAspect="1"/>
-          </p:cNvPicPr>
-          <p:nvPr>
-            <p:ph type="pic" idx="1"/>
-          </p:nvPr>
-        </p:nvPicPr>
-        <p:blipFill rotWithShape="1">
-          <a:blip r:embed="rId3" cstate="print">
-            <a:extLst>
-              <a:ext uri="{28A0092B-C50C-407E-A947-70E740481C1C}">
-                <a14:useLocalDpi xmlns:a14="http://schemas.microsoft.com/office/drawing/2010/main" val="0"/>
-              </a:ext>
-            </a:extLst>
-          </a:blip>
-          <a:srcRect/>
-          <a:stretch/>
-        </p:blipFill>
-        <p:spPr/>
-      </p:pic>
+            <a:r>
+              <a:rPr lang="pt-BR" dirty="0"/>
+              <a:t>Infância e adolescência</a:t>
+            </a:r>
+          </a:p>
+        </p:txBody>
+      </p:sp>
       <p:sp>
         <p:nvSpPr>
           <p:cNvPr id="3" name="Espaço reservado para texto 2"/>
@@ -5715,353 +5710,48 @@
             <a:spLocks noGrp="1"/>
           </p:cNvSpPr>
           <p:nvPr>
-            <p:ph type="body" sz="half" idx="2"/>
-          </p:nvPr>
-        </p:nvSpPr>
-        <p:spPr/>
-        <p:txBody>
-          <a:bodyPr rtlCol="0"/>
-          <a:lstStyle/>
-          <a:p>
-            <a:pPr rtl="0"/>
-            <a:r>
-              <a:rPr lang="pt-BR" dirty="0"/>
-              <a:t>Legenda</a:t>
-            </a:r>
-          </a:p>
-        </p:txBody>
-      </p:sp>
-      <p:sp>
-        <p:nvSpPr>
-          <p:cNvPr id="6" name="Rounded Rectangle 5" hidden="1"/>
-          <p:cNvSpPr/>
-          <p:nvPr/>
+            <p:ph type="body" idx="1"/>
+          </p:nvPr>
         </p:nvSpPr>
         <p:spPr>
           <a:xfrm>
-            <a:off x="12344400" y="152400"/>
-            <a:ext cx="1295400" cy="6553200"/>
+            <a:off x="1066800" y="1844824"/>
+            <a:ext cx="10058400" cy="2592288"/>
           </a:xfrm>
-          <a:prstGeom prst="roundRect">
-            <a:avLst>
-              <a:gd name="adj" fmla="val 9717"/>
-            </a:avLst>
-          </a:prstGeom>
-          <a:solidFill>
-            <a:srgbClr val="A6A6A6"/>
-          </a:solidFill>
-          <a:ln>
-            <a:noFill/>
-          </a:ln>
         </p:spPr>
-        <p:style>
-          <a:lnRef idx="2">
-            <a:schemeClr val="accent1">
-              <a:shade val="50000"/>
-            </a:schemeClr>
-          </a:lnRef>
-          <a:fillRef idx="1">
-            <a:schemeClr val="accent1"/>
-          </a:fillRef>
-          <a:effectRef idx="0">
-            <a:schemeClr val="accent1"/>
-          </a:effectRef>
-          <a:fontRef idx="minor">
-            <a:schemeClr val="lt1"/>
-          </a:fontRef>
-        </p:style>
-        <p:txBody>
-          <a:bodyPr rot="0" spcFirstLastPara="0" vertOverflow="overflow" horzOverflow="overflow" vert="horz" wrap="square" lIns="91440" tIns="45720" rIns="91440" bIns="45720" numCol="1" spcCol="0" rtlCol="0" fromWordArt="0" anchor="t" anchorCtr="0" forceAA="0" compatLnSpc="1">
-            <a:prstTxWarp prst="textNoShape">
-              <a:avLst/>
-            </a:prstTxWarp>
-            <a:noAutofit/>
+        <p:txBody>
+          <a:bodyPr rtlCol="0">
+            <a:normAutofit/>
           </a:bodyPr>
           <a:lstStyle/>
           <a:p>
-            <a:pPr rtl="0"/>
-            <a:r>
-              <a:rPr lang="pt-BR" sz="1200" b="1" i="1" dirty="0">
-                <a:latin typeface="Arial" pitchFamily="34" charset="0"/>
-                <a:cs typeface="Arial" pitchFamily="34" charset="0"/>
-              </a:rPr>
-              <a:t>NOTE:</a:t>
-            </a:r>
-          </a:p>
-          <a:p>
-            <a:pPr rtl="0"/>
-            <a:r>
-              <a:rPr lang="pt-BR" sz="1200" i="1" dirty="0" err="1">
-                <a:latin typeface="Arial" pitchFamily="34" charset="0"/>
-                <a:cs typeface="Arial" pitchFamily="34" charset="0"/>
-              </a:rPr>
-              <a:t>To</a:t>
-            </a:r>
-            <a:r>
-              <a:rPr lang="pt-BR" sz="1200" i="1" dirty="0">
-                <a:latin typeface="Arial" pitchFamily="34" charset="0"/>
-                <a:cs typeface="Arial" pitchFamily="34" charset="0"/>
-              </a:rPr>
-              <a:t> </a:t>
-            </a:r>
-            <a:r>
-              <a:rPr lang="pt-BR" sz="1200" i="1" dirty="0" err="1">
-                <a:latin typeface="Arial" pitchFamily="34" charset="0"/>
-                <a:cs typeface="Arial" pitchFamily="34" charset="0"/>
-              </a:rPr>
-              <a:t>change</a:t>
-            </a:r>
-            <a:r>
-              <a:rPr lang="pt-BR" sz="1200" i="1" dirty="0">
-                <a:latin typeface="Arial" pitchFamily="34" charset="0"/>
-                <a:cs typeface="Arial" pitchFamily="34" charset="0"/>
-              </a:rPr>
-              <a:t> </a:t>
-            </a:r>
-            <a:r>
-              <a:rPr lang="pt-BR" sz="1200" i="1" dirty="0" err="1">
-                <a:latin typeface="Arial" pitchFamily="34" charset="0"/>
-                <a:cs typeface="Arial" pitchFamily="34" charset="0"/>
-              </a:rPr>
-              <a:t>images</a:t>
-            </a:r>
-            <a:r>
-              <a:rPr lang="pt-BR" sz="1200" i="1" dirty="0">
-                <a:latin typeface="Arial" pitchFamily="34" charset="0"/>
-                <a:cs typeface="Arial" pitchFamily="34" charset="0"/>
-              </a:rPr>
-              <a:t> </a:t>
-            </a:r>
-            <a:r>
-              <a:rPr lang="pt-BR" sz="1200" i="1" dirty="0" err="1">
-                <a:latin typeface="Arial" pitchFamily="34" charset="0"/>
-                <a:cs typeface="Arial" pitchFamily="34" charset="0"/>
-              </a:rPr>
-              <a:t>on</a:t>
-            </a:r>
-            <a:r>
-              <a:rPr lang="pt-BR" sz="1200" i="1" dirty="0">
-                <a:latin typeface="Arial" pitchFamily="34" charset="0"/>
-                <a:cs typeface="Arial" pitchFamily="34" charset="0"/>
-              </a:rPr>
-              <a:t> </a:t>
-            </a:r>
-            <a:r>
-              <a:rPr lang="pt-BR" sz="1200" i="1" dirty="0" err="1">
-                <a:latin typeface="Arial" pitchFamily="34" charset="0"/>
-                <a:cs typeface="Arial" pitchFamily="34" charset="0"/>
-              </a:rPr>
-              <a:t>this</a:t>
-            </a:r>
-            <a:r>
-              <a:rPr lang="pt-BR" sz="1200" i="1" dirty="0">
-                <a:latin typeface="Arial" pitchFamily="34" charset="0"/>
-                <a:cs typeface="Arial" pitchFamily="34" charset="0"/>
-              </a:rPr>
-              <a:t> slide, </a:t>
-            </a:r>
-            <a:r>
-              <a:rPr lang="pt-BR" sz="1200" i="1" dirty="0" err="1">
-                <a:latin typeface="Arial" pitchFamily="34" charset="0"/>
-                <a:cs typeface="Arial" pitchFamily="34" charset="0"/>
-              </a:rPr>
-              <a:t>select</a:t>
-            </a:r>
-            <a:r>
-              <a:rPr lang="pt-BR" sz="1200" i="1" dirty="0">
-                <a:latin typeface="Arial" pitchFamily="34" charset="0"/>
-                <a:cs typeface="Arial" pitchFamily="34" charset="0"/>
-              </a:rPr>
-              <a:t> a </a:t>
-            </a:r>
-            <a:r>
-              <a:rPr lang="pt-BR" sz="1200" i="1" dirty="0" err="1">
-                <a:latin typeface="Arial" pitchFamily="34" charset="0"/>
-                <a:cs typeface="Arial" pitchFamily="34" charset="0"/>
-              </a:rPr>
-              <a:t>picture</a:t>
-            </a:r>
-            <a:r>
-              <a:rPr lang="pt-BR" sz="1200" i="1" dirty="0">
-                <a:latin typeface="Arial" pitchFamily="34" charset="0"/>
-                <a:cs typeface="Arial" pitchFamily="34" charset="0"/>
-              </a:rPr>
-              <a:t> </a:t>
-            </a:r>
-            <a:r>
-              <a:rPr lang="pt-BR" sz="1200" i="1" dirty="0" err="1">
-                <a:latin typeface="Arial" pitchFamily="34" charset="0"/>
-                <a:cs typeface="Arial" pitchFamily="34" charset="0"/>
-              </a:rPr>
-              <a:t>and</a:t>
-            </a:r>
-            <a:r>
-              <a:rPr lang="pt-BR" sz="1200" i="1" dirty="0">
-                <a:latin typeface="Arial" pitchFamily="34" charset="0"/>
-                <a:cs typeface="Arial" pitchFamily="34" charset="0"/>
-              </a:rPr>
-              <a:t> delete it. </a:t>
-            </a:r>
-            <a:r>
-              <a:rPr lang="pt-BR" sz="1200" i="1" dirty="0" err="1">
-                <a:latin typeface="Arial" pitchFamily="34" charset="0"/>
-                <a:cs typeface="Arial" pitchFamily="34" charset="0"/>
-              </a:rPr>
-              <a:t>Then</a:t>
-            </a:r>
-            <a:r>
-              <a:rPr lang="pt-BR" sz="1200" i="1" dirty="0">
-                <a:latin typeface="Arial" pitchFamily="34" charset="0"/>
-                <a:cs typeface="Arial" pitchFamily="34" charset="0"/>
-              </a:rPr>
-              <a:t> click </a:t>
-            </a:r>
-            <a:r>
-              <a:rPr lang="pt-BR" sz="1200" i="1" dirty="0" err="1">
-                <a:latin typeface="Arial" pitchFamily="34" charset="0"/>
-                <a:cs typeface="Arial" pitchFamily="34" charset="0"/>
-              </a:rPr>
-              <a:t>the</a:t>
-            </a:r>
-            <a:r>
-              <a:rPr lang="pt-BR" sz="1200" i="1" dirty="0">
-                <a:latin typeface="Arial" pitchFamily="34" charset="0"/>
-                <a:cs typeface="Arial" pitchFamily="34" charset="0"/>
-              </a:rPr>
-              <a:t> </a:t>
-            </a:r>
-            <a:r>
-              <a:rPr lang="pt-BR" sz="1200" i="1" dirty="0" err="1">
-                <a:latin typeface="Arial" pitchFamily="34" charset="0"/>
-                <a:cs typeface="Arial" pitchFamily="34" charset="0"/>
-              </a:rPr>
-              <a:t>Insert</a:t>
-            </a:r>
-            <a:r>
-              <a:rPr lang="pt-BR" sz="1200" i="1" dirty="0">
-                <a:latin typeface="Arial" pitchFamily="34" charset="0"/>
-                <a:cs typeface="Arial" pitchFamily="34" charset="0"/>
-              </a:rPr>
-              <a:t> Picture </a:t>
-            </a:r>
-            <a:r>
-              <a:rPr lang="pt-BR" sz="1200" i="1" dirty="0" err="1">
-                <a:latin typeface="Arial" pitchFamily="34" charset="0"/>
-                <a:cs typeface="Arial" pitchFamily="34" charset="0"/>
-              </a:rPr>
-              <a:t>icon</a:t>
-            </a:r>
-            <a:endParaRPr lang="pt-BR" sz="1200" i="1" dirty="0">
-              <a:latin typeface="Arial" pitchFamily="34" charset="0"/>
-              <a:cs typeface="Arial" pitchFamily="34" charset="0"/>
-            </a:endParaRPr>
-          </a:p>
-          <a:p>
-            <a:pPr rtl="0"/>
-            <a:r>
-              <a:rPr lang="pt-BR" sz="1200" i="1" dirty="0">
-                <a:latin typeface="Arial" pitchFamily="34" charset="0"/>
-                <a:cs typeface="Arial" pitchFamily="34" charset="0"/>
-              </a:rPr>
-              <a:t>in </a:t>
-            </a:r>
-            <a:r>
-              <a:rPr lang="pt-BR" sz="1200" i="1" dirty="0" err="1">
-                <a:latin typeface="Arial" pitchFamily="34" charset="0"/>
-                <a:cs typeface="Arial" pitchFamily="34" charset="0"/>
-              </a:rPr>
-              <a:t>the</a:t>
-            </a:r>
-            <a:r>
-              <a:rPr lang="pt-BR" sz="1200" i="1" dirty="0">
-                <a:latin typeface="Arial" pitchFamily="34" charset="0"/>
-                <a:cs typeface="Arial" pitchFamily="34" charset="0"/>
-              </a:rPr>
-              <a:t> </a:t>
-            </a:r>
-            <a:r>
-              <a:rPr lang="pt-BR" sz="1200" i="1" dirty="0" err="1">
-                <a:latin typeface="Arial" pitchFamily="34" charset="0"/>
-                <a:cs typeface="Arial" pitchFamily="34" charset="0"/>
-              </a:rPr>
-              <a:t>placeholder</a:t>
-            </a:r>
-            <a:r>
-              <a:rPr lang="pt-BR" sz="1200" i="1" dirty="0">
-                <a:latin typeface="Arial" pitchFamily="34" charset="0"/>
-                <a:cs typeface="Arial" pitchFamily="34" charset="0"/>
-              </a:rPr>
-              <a:t> </a:t>
-            </a:r>
-            <a:r>
-              <a:rPr lang="pt-BR" sz="1200" i="1" dirty="0" err="1">
-                <a:latin typeface="Arial" pitchFamily="34" charset="0"/>
-                <a:cs typeface="Arial" pitchFamily="34" charset="0"/>
-              </a:rPr>
-              <a:t>to</a:t>
-            </a:r>
-            <a:r>
-              <a:rPr lang="pt-BR" sz="1200" i="1" dirty="0">
-                <a:latin typeface="Arial" pitchFamily="34" charset="0"/>
-                <a:cs typeface="Arial" pitchFamily="34" charset="0"/>
-              </a:rPr>
-              <a:t> </a:t>
-            </a:r>
-            <a:r>
-              <a:rPr lang="pt-BR" sz="1200" i="1" dirty="0" err="1">
-                <a:latin typeface="Arial" pitchFamily="34" charset="0"/>
-                <a:cs typeface="Arial" pitchFamily="34" charset="0"/>
-              </a:rPr>
-              <a:t>insert</a:t>
-            </a:r>
-            <a:r>
-              <a:rPr lang="pt-BR" sz="1200" i="1" dirty="0">
-                <a:latin typeface="Arial" pitchFamily="34" charset="0"/>
-                <a:cs typeface="Arial" pitchFamily="34" charset="0"/>
-              </a:rPr>
-              <a:t> </a:t>
-            </a:r>
-            <a:r>
-              <a:rPr lang="pt-BR" sz="1200" i="1" dirty="0" err="1">
-                <a:latin typeface="Arial" pitchFamily="34" charset="0"/>
-                <a:cs typeface="Arial" pitchFamily="34" charset="0"/>
-              </a:rPr>
-              <a:t>your</a:t>
-            </a:r>
-            <a:r>
-              <a:rPr lang="pt-BR" sz="1200" i="1" dirty="0">
-                <a:latin typeface="Arial" pitchFamily="34" charset="0"/>
-                <a:cs typeface="Arial" pitchFamily="34" charset="0"/>
-              </a:rPr>
-              <a:t> </a:t>
-            </a:r>
-            <a:r>
-              <a:rPr lang="pt-BR" sz="1200" i="1" dirty="0" err="1">
-                <a:latin typeface="Arial" pitchFamily="34" charset="0"/>
-                <a:cs typeface="Arial" pitchFamily="34" charset="0"/>
-              </a:rPr>
-              <a:t>own</a:t>
-            </a:r>
-            <a:r>
-              <a:rPr lang="pt-BR" sz="1200" i="1" dirty="0">
-                <a:latin typeface="Arial" pitchFamily="34" charset="0"/>
-                <a:cs typeface="Arial" pitchFamily="34" charset="0"/>
-              </a:rPr>
-              <a:t> </a:t>
-            </a:r>
-            <a:r>
-              <a:rPr lang="pt-BR" sz="1200" i="1" dirty="0" err="1">
-                <a:latin typeface="Arial" pitchFamily="34" charset="0"/>
-                <a:cs typeface="Arial" pitchFamily="34" charset="0"/>
-              </a:rPr>
-              <a:t>image</a:t>
-            </a:r>
-            <a:r>
-              <a:rPr lang="pt-BR" sz="1200" i="1" dirty="0">
-                <a:latin typeface="Arial" pitchFamily="34" charset="0"/>
-                <a:cs typeface="Arial" pitchFamily="34" charset="0"/>
-              </a:rPr>
-              <a:t>.</a:t>
+            <a:pPr marL="457200" indent="-457200">
+              <a:buFont typeface="Arial" panose="020B0604020202020204" pitchFamily="34" charset="0"/>
+              <a:buChar char="•"/>
+            </a:pPr>
+            <a:r>
+              <a:rPr lang="pt-BR" sz="3200" dirty="0"/>
+              <a:t>Medo de praticar esportes;</a:t>
+            </a:r>
+          </a:p>
+          <a:p>
+            <a:pPr marL="457200" indent="-457200">
+              <a:buFont typeface="Arial" panose="020B0604020202020204" pitchFamily="34" charset="0"/>
+              <a:buChar char="•"/>
+            </a:pPr>
+            <a:r>
+              <a:rPr lang="pt-BR" sz="3200" dirty="0"/>
+              <a:t>Obesidade;</a:t>
+            </a:r>
+          </a:p>
+          <a:p>
+            <a:pPr marL="457200" indent="-457200" rtl="0">
+              <a:buFont typeface="Arial" panose="020B0604020202020204" pitchFamily="34" charset="0"/>
+              <a:buChar char="•"/>
+            </a:pPr>
+            <a:r>
+              <a:rPr lang="pt-BR" sz="3200" dirty="0"/>
+              <a:t>Bullying.</a:t>
             </a:r>
           </a:p>
         </p:txBody>
@@ -6069,7 +5759,7 @@
     </p:spTree>
     <p:extLst>
       <p:ext uri="{BB962C8B-B14F-4D97-AF65-F5344CB8AC3E}">
-        <p14:creationId xmlns:p14="http://schemas.microsoft.com/office/powerpoint/2010/main" val="3053388791"/>
+        <p14:creationId xmlns:p14="http://schemas.microsoft.com/office/powerpoint/2010/main" val="2993111047"/>
       </p:ext>
     </p:extLst>
   </p:cSld>
@@ -6118,53 +5808,216 @@
             <p:ph type="title"/>
           </p:nvPr>
         </p:nvSpPr>
-        <p:spPr/>
-        <p:txBody>
-          <a:bodyPr rtlCol="0"/>
+        <p:spPr>
+          <a:xfrm>
+            <a:off x="7924800" y="838200"/>
+            <a:ext cx="3657600" cy="2133600"/>
+          </a:xfrm>
+        </p:spPr>
+        <p:txBody>
+          <a:bodyPr rtlCol="0" anchor="b">
+            <a:normAutofit/>
+          </a:bodyPr>
           <a:lstStyle/>
           <a:p>
             <a:pPr rtl="0"/>
             <a:r>
               <a:rPr lang="pt-BR" dirty="0"/>
-              <a:t>Título e layout de conteúdo com lista</a:t>
-            </a:r>
-          </a:p>
-        </p:txBody>
-      </p:sp>
-      <p:sp>
-        <p:nvSpPr>
-          <p:cNvPr id="3" name="Espaço reservado para conteúdo 2"/>
-          <p:cNvSpPr>
-            <a:spLocks noGrp="1"/>
-          </p:cNvSpPr>
-          <p:nvPr>
-            <p:ph idx="1"/>
-          </p:nvPr>
-        </p:nvSpPr>
-        <p:spPr/>
-        <p:txBody>
-          <a:bodyPr rtlCol="0"/>
+              <a:t>Como conheci o basquete</a:t>
+            </a:r>
+          </a:p>
+        </p:txBody>
+      </p:sp>
+      <p:pic>
+        <p:nvPicPr>
+          <p:cNvPr id="6" name="Imagem 5" descr="Pessoas em uma quadra&#10;&#10;Descrição gerada automaticamente">
+            <a:extLst>
+              <a:ext uri="{FF2B5EF4-FFF2-40B4-BE49-F238E27FC236}">
+                <a16:creationId xmlns:a16="http://schemas.microsoft.com/office/drawing/2014/main" id="{1ADC638B-01EA-F1B8-E683-04AADEB222C0}"/>
+              </a:ext>
+            </a:extLst>
+          </p:cNvPr>
+          <p:cNvPicPr>
+            <a:picLocks noChangeAspect="1"/>
+          </p:cNvPicPr>
+          <p:nvPr/>
+        </p:nvPicPr>
+        <p:blipFill>
+          <a:blip r:embed="rId3">
+            <a:extLst>
+              <a:ext uri="{28A0092B-C50C-407E-A947-70E740481C1C}">
+                <a14:useLocalDpi xmlns:a14="http://schemas.microsoft.com/office/drawing/2010/main" val="0"/>
+              </a:ext>
+            </a:extLst>
+          </a:blip>
+          <a:stretch>
+            <a:fillRect/>
+          </a:stretch>
+        </p:blipFill>
+        <p:spPr>
+          <a:xfrm>
+            <a:off x="0" y="1012984"/>
+            <a:ext cx="7239000" cy="4832032"/>
+          </a:xfrm>
+          <a:prstGeom prst="rect">
+            <a:avLst/>
+          </a:prstGeom>
+          <a:noFill/>
+        </p:spPr>
+      </p:pic>
+      <p:sp>
+        <p:nvSpPr>
+          <p:cNvPr id="13" name="Text Placeholder 3">
+            <a:extLst>
+              <a:ext uri="{FF2B5EF4-FFF2-40B4-BE49-F238E27FC236}">
+                <a16:creationId xmlns:a16="http://schemas.microsoft.com/office/drawing/2014/main" id="{013C02FE-8861-BDA5-93FF-3A7BEA4136B4}"/>
+              </a:ext>
+            </a:extLst>
+          </p:cNvPr>
+          <p:cNvSpPr>
+            <a:spLocks noGrp="1"/>
+          </p:cNvSpPr>
+          <p:nvPr>
+            <p:ph type="body" sz="half" idx="2"/>
+          </p:nvPr>
+        </p:nvSpPr>
+        <p:spPr>
+          <a:xfrm>
+            <a:off x="7464152" y="3124200"/>
+            <a:ext cx="4608512" cy="2895600"/>
+          </a:xfrm>
+        </p:spPr>
+        <p:txBody>
+          <a:bodyPr/>
           <a:lstStyle/>
           <a:p>
-            <a:pPr rtl="0"/>
-            <a:r>
-              <a:rPr lang="pt-BR" dirty="0"/>
-              <a:t>Adicione aqui seu primeiro marcador</a:t>
-            </a:r>
-          </a:p>
-          <a:p>
-            <a:pPr rtl="0"/>
-            <a:r>
-              <a:rPr lang="pt-BR" dirty="0"/>
-              <a:t>Adicione aqui seu segundo marcador</a:t>
-            </a:r>
-          </a:p>
-          <a:p>
-            <a:pPr rtl="0"/>
-            <a:r>
-              <a:rPr lang="pt-BR" dirty="0"/>
-              <a:t>Adicione aqui seu terceiro marcador</a:t>
-            </a:r>
+            <a:pPr marL="342900" indent="-342900">
+              <a:buFont typeface="Arial" panose="020B0604020202020204" pitchFamily="34" charset="0"/>
+              <a:buChar char="•"/>
+            </a:pPr>
+            <a:r>
+              <a:rPr lang="en-US" dirty="0"/>
+              <a:t>2017 </a:t>
+            </a:r>
+            <a:r>
+              <a:rPr lang="en-US" dirty="0" err="1"/>
+              <a:t>conheci</a:t>
+            </a:r>
+            <a:r>
+              <a:rPr lang="en-US" dirty="0"/>
+              <a:t> o </a:t>
+            </a:r>
+            <a:r>
+              <a:rPr lang="en-US" dirty="0" err="1"/>
+              <a:t>basquete</a:t>
+            </a:r>
+            <a:endParaRPr lang="en-US" dirty="0"/>
+          </a:p>
+          <a:p>
+            <a:pPr marL="342900" indent="-342900">
+              <a:buFont typeface="Arial" panose="020B0604020202020204" pitchFamily="34" charset="0"/>
+              <a:buChar char="•"/>
+            </a:pPr>
+            <a:r>
+              <a:rPr lang="en-US" dirty="0"/>
+              <a:t>Me </a:t>
+            </a:r>
+            <a:r>
+              <a:rPr lang="en-US" dirty="0" err="1"/>
+              <a:t>identifiquei</a:t>
+            </a:r>
+            <a:r>
+              <a:rPr lang="en-US" dirty="0"/>
+              <a:t> </a:t>
+            </a:r>
+            <a:r>
+              <a:rPr lang="en-US" dirty="0" err="1"/>
+              <a:t>muito</a:t>
+            </a:r>
+            <a:r>
+              <a:rPr lang="en-US" dirty="0"/>
+              <a:t> com um </a:t>
+            </a:r>
+            <a:r>
+              <a:rPr lang="en-US" dirty="0" err="1"/>
+              <a:t>esporte</a:t>
+            </a:r>
+            <a:r>
+              <a:rPr lang="en-US" dirty="0"/>
+              <a:t> pela </a:t>
+            </a:r>
+            <a:r>
+              <a:rPr lang="en-US" dirty="0" err="1"/>
+              <a:t>primeira</a:t>
+            </a:r>
+            <a:r>
+              <a:rPr lang="en-US" dirty="0"/>
+              <a:t> </a:t>
+            </a:r>
+            <a:r>
+              <a:rPr lang="en-US" dirty="0" err="1"/>
+              <a:t>vez</a:t>
+            </a:r>
+            <a:endParaRPr lang="en-US" dirty="0"/>
+          </a:p>
+          <a:p>
+            <a:pPr marL="342900" indent="-342900">
+              <a:buFont typeface="Arial" panose="020B0604020202020204" pitchFamily="34" charset="0"/>
+              <a:buChar char="•"/>
+            </a:pPr>
+            <a:r>
+              <a:rPr lang="en-US" dirty="0"/>
+              <a:t>2018 </a:t>
+            </a:r>
+            <a:r>
+              <a:rPr lang="en-US" dirty="0" err="1"/>
+              <a:t>ganhei</a:t>
+            </a:r>
+            <a:r>
+              <a:rPr lang="en-US" dirty="0"/>
+              <a:t> </a:t>
+            </a:r>
+            <a:r>
+              <a:rPr lang="en-US" dirty="0" err="1"/>
+              <a:t>uma</a:t>
+            </a:r>
+            <a:r>
+              <a:rPr lang="en-US" dirty="0"/>
+              <a:t> bola</a:t>
+            </a:r>
+          </a:p>
+          <a:p>
+            <a:pPr marL="342900" indent="-342900">
+              <a:buFont typeface="Arial" panose="020B0604020202020204" pitchFamily="34" charset="0"/>
+              <a:buChar char="•"/>
+            </a:pPr>
+            <a:r>
+              <a:rPr lang="en-US" dirty="0"/>
+              <a:t>2019 </a:t>
+            </a:r>
+            <a:r>
+              <a:rPr lang="en-US" dirty="0" err="1"/>
+              <a:t>tinha</a:t>
+            </a:r>
+            <a:r>
+              <a:rPr lang="en-US" dirty="0"/>
+              <a:t> </a:t>
+            </a:r>
+            <a:r>
+              <a:rPr lang="en-US" dirty="0" err="1"/>
+              <a:t>perdido</a:t>
+            </a:r>
+            <a:r>
+              <a:rPr lang="en-US" dirty="0"/>
+              <a:t> 40kgs</a:t>
+            </a:r>
+          </a:p>
+          <a:p>
+            <a:pPr marL="342900" indent="-342900">
+              <a:buFont typeface="Arial" panose="020B0604020202020204" pitchFamily="34" charset="0"/>
+              <a:buChar char="•"/>
+            </a:pPr>
+            <a:endParaRPr lang="en-US" dirty="0"/>
           </a:p>
         </p:txBody>
       </p:sp>
@@ -6690,12 +6543,36 @@
           <a:p>
             <a:pPr rtl="0"/>
             <a:r>
-              <a:rPr lang="pt-BR" dirty="0"/>
-              <a:t>Adicionar título de slide – 1</a:t>
-            </a:r>
-          </a:p>
-        </p:txBody>
-      </p:sp>
+              <a:rPr lang="pt-BR"/>
+              <a:t>Agradecimentos</a:t>
+            </a:r>
+            <a:endParaRPr lang="pt-BR" dirty="0"/>
+          </a:p>
+        </p:txBody>
+      </p:sp>
+      <p:pic>
+        <p:nvPicPr>
+          <p:cNvPr id="5" name="Espaço reservado para imagem 4" descr="Jogadores de basquete levantando as mãos juntos"/>
+          <p:cNvPicPr>
+            <a:picLocks noGrp="1" noChangeAspect="1"/>
+          </p:cNvPicPr>
+          <p:nvPr>
+            <p:ph type="pic" idx="1"/>
+          </p:nvPr>
+        </p:nvPicPr>
+        <p:blipFill rotWithShape="1">
+          <a:blip r:embed="rId3" cstate="print">
+            <a:extLst>
+              <a:ext uri="{28A0092B-C50C-407E-A947-70E740481C1C}">
+                <a14:useLocalDpi xmlns:a14="http://schemas.microsoft.com/office/drawing/2010/main" val="0"/>
+              </a:ext>
+            </a:extLst>
+          </a:blip>
+          <a:srcRect/>
+          <a:stretch/>
+        </p:blipFill>
+        <p:spPr/>
+      </p:pic>
       <p:sp>
         <p:nvSpPr>
           <p:cNvPr id="3" name="Espaço reservado para texto 2"/>
@@ -6703,7 +6580,7 @@
             <a:spLocks noGrp="1"/>
           </p:cNvSpPr>
           <p:nvPr>
-            <p:ph type="body" idx="1"/>
+            <p:ph type="body" sz="half" idx="2"/>
           </p:nvPr>
         </p:nvSpPr>
         <p:spPr/>
@@ -6712,14 +6589,352 @@
           <a:lstStyle/>
           <a:p>
             <a:pPr rtl="0"/>
-            <a:endParaRPr lang="pt-BR" dirty="0"/>
+            <a:r>
+              <a:rPr lang="pt-BR" dirty="0"/>
+              <a:t>Legenda</a:t>
+            </a:r>
+          </a:p>
+        </p:txBody>
+      </p:sp>
+      <p:sp>
+        <p:nvSpPr>
+          <p:cNvPr id="6" name="Rounded Rectangle 5" hidden="1"/>
+          <p:cNvSpPr/>
+          <p:nvPr/>
+        </p:nvSpPr>
+        <p:spPr>
+          <a:xfrm>
+            <a:off x="12344400" y="152400"/>
+            <a:ext cx="1295400" cy="6553200"/>
+          </a:xfrm>
+          <a:prstGeom prst="roundRect">
+            <a:avLst>
+              <a:gd name="adj" fmla="val 9717"/>
+            </a:avLst>
+          </a:prstGeom>
+          <a:solidFill>
+            <a:srgbClr val="A6A6A6"/>
+          </a:solidFill>
+          <a:ln>
+            <a:noFill/>
+          </a:ln>
+        </p:spPr>
+        <p:style>
+          <a:lnRef idx="2">
+            <a:schemeClr val="accent1">
+              <a:shade val="50000"/>
+            </a:schemeClr>
+          </a:lnRef>
+          <a:fillRef idx="1">
+            <a:schemeClr val="accent1"/>
+          </a:fillRef>
+          <a:effectRef idx="0">
+            <a:schemeClr val="accent1"/>
+          </a:effectRef>
+          <a:fontRef idx="minor">
+            <a:schemeClr val="lt1"/>
+          </a:fontRef>
+        </p:style>
+        <p:txBody>
+          <a:bodyPr rot="0" spcFirstLastPara="0" vertOverflow="overflow" horzOverflow="overflow" vert="horz" wrap="square" lIns="91440" tIns="45720" rIns="91440" bIns="45720" numCol="1" spcCol="0" rtlCol="0" fromWordArt="0" anchor="t" anchorCtr="0" forceAA="0" compatLnSpc="1">
+            <a:prstTxWarp prst="textNoShape">
+              <a:avLst/>
+            </a:prstTxWarp>
+            <a:noAutofit/>
+          </a:bodyPr>
+          <a:lstStyle/>
+          <a:p>
+            <a:pPr rtl="0"/>
+            <a:r>
+              <a:rPr lang="pt-BR" sz="1200" b="1" i="1" dirty="0">
+                <a:latin typeface="Arial" pitchFamily="34" charset="0"/>
+                <a:cs typeface="Arial" pitchFamily="34" charset="0"/>
+              </a:rPr>
+              <a:t>NOTE:</a:t>
+            </a:r>
+          </a:p>
+          <a:p>
+            <a:pPr rtl="0"/>
+            <a:r>
+              <a:rPr lang="pt-BR" sz="1200" i="1" dirty="0" err="1">
+                <a:latin typeface="Arial" pitchFamily="34" charset="0"/>
+                <a:cs typeface="Arial" pitchFamily="34" charset="0"/>
+              </a:rPr>
+              <a:t>To</a:t>
+            </a:r>
+            <a:r>
+              <a:rPr lang="pt-BR" sz="1200" i="1" dirty="0">
+                <a:latin typeface="Arial" pitchFamily="34" charset="0"/>
+                <a:cs typeface="Arial" pitchFamily="34" charset="0"/>
+              </a:rPr>
+              <a:t> </a:t>
+            </a:r>
+            <a:r>
+              <a:rPr lang="pt-BR" sz="1200" i="1" dirty="0" err="1">
+                <a:latin typeface="Arial" pitchFamily="34" charset="0"/>
+                <a:cs typeface="Arial" pitchFamily="34" charset="0"/>
+              </a:rPr>
+              <a:t>change</a:t>
+            </a:r>
+            <a:r>
+              <a:rPr lang="pt-BR" sz="1200" i="1" dirty="0">
+                <a:latin typeface="Arial" pitchFamily="34" charset="0"/>
+                <a:cs typeface="Arial" pitchFamily="34" charset="0"/>
+              </a:rPr>
+              <a:t> </a:t>
+            </a:r>
+            <a:r>
+              <a:rPr lang="pt-BR" sz="1200" i="1" dirty="0" err="1">
+                <a:latin typeface="Arial" pitchFamily="34" charset="0"/>
+                <a:cs typeface="Arial" pitchFamily="34" charset="0"/>
+              </a:rPr>
+              <a:t>images</a:t>
+            </a:r>
+            <a:r>
+              <a:rPr lang="pt-BR" sz="1200" i="1" dirty="0">
+                <a:latin typeface="Arial" pitchFamily="34" charset="0"/>
+                <a:cs typeface="Arial" pitchFamily="34" charset="0"/>
+              </a:rPr>
+              <a:t> </a:t>
+            </a:r>
+            <a:r>
+              <a:rPr lang="pt-BR" sz="1200" i="1" dirty="0" err="1">
+                <a:latin typeface="Arial" pitchFamily="34" charset="0"/>
+                <a:cs typeface="Arial" pitchFamily="34" charset="0"/>
+              </a:rPr>
+              <a:t>on</a:t>
+            </a:r>
+            <a:r>
+              <a:rPr lang="pt-BR" sz="1200" i="1" dirty="0">
+                <a:latin typeface="Arial" pitchFamily="34" charset="0"/>
+                <a:cs typeface="Arial" pitchFamily="34" charset="0"/>
+              </a:rPr>
+              <a:t> </a:t>
+            </a:r>
+            <a:r>
+              <a:rPr lang="pt-BR" sz="1200" i="1" dirty="0" err="1">
+                <a:latin typeface="Arial" pitchFamily="34" charset="0"/>
+                <a:cs typeface="Arial" pitchFamily="34" charset="0"/>
+              </a:rPr>
+              <a:t>this</a:t>
+            </a:r>
+            <a:r>
+              <a:rPr lang="pt-BR" sz="1200" i="1" dirty="0">
+                <a:latin typeface="Arial" pitchFamily="34" charset="0"/>
+                <a:cs typeface="Arial" pitchFamily="34" charset="0"/>
+              </a:rPr>
+              <a:t> slide, </a:t>
+            </a:r>
+            <a:r>
+              <a:rPr lang="pt-BR" sz="1200" i="1" dirty="0" err="1">
+                <a:latin typeface="Arial" pitchFamily="34" charset="0"/>
+                <a:cs typeface="Arial" pitchFamily="34" charset="0"/>
+              </a:rPr>
+              <a:t>select</a:t>
+            </a:r>
+            <a:r>
+              <a:rPr lang="pt-BR" sz="1200" i="1" dirty="0">
+                <a:latin typeface="Arial" pitchFamily="34" charset="0"/>
+                <a:cs typeface="Arial" pitchFamily="34" charset="0"/>
+              </a:rPr>
+              <a:t> a </a:t>
+            </a:r>
+            <a:r>
+              <a:rPr lang="pt-BR" sz="1200" i="1" dirty="0" err="1">
+                <a:latin typeface="Arial" pitchFamily="34" charset="0"/>
+                <a:cs typeface="Arial" pitchFamily="34" charset="0"/>
+              </a:rPr>
+              <a:t>picture</a:t>
+            </a:r>
+            <a:r>
+              <a:rPr lang="pt-BR" sz="1200" i="1" dirty="0">
+                <a:latin typeface="Arial" pitchFamily="34" charset="0"/>
+                <a:cs typeface="Arial" pitchFamily="34" charset="0"/>
+              </a:rPr>
+              <a:t> </a:t>
+            </a:r>
+            <a:r>
+              <a:rPr lang="pt-BR" sz="1200" i="1" dirty="0" err="1">
+                <a:latin typeface="Arial" pitchFamily="34" charset="0"/>
+                <a:cs typeface="Arial" pitchFamily="34" charset="0"/>
+              </a:rPr>
+              <a:t>and</a:t>
+            </a:r>
+            <a:r>
+              <a:rPr lang="pt-BR" sz="1200" i="1" dirty="0">
+                <a:latin typeface="Arial" pitchFamily="34" charset="0"/>
+                <a:cs typeface="Arial" pitchFamily="34" charset="0"/>
+              </a:rPr>
+              <a:t> delete it. </a:t>
+            </a:r>
+            <a:r>
+              <a:rPr lang="pt-BR" sz="1200" i="1" dirty="0" err="1">
+                <a:latin typeface="Arial" pitchFamily="34" charset="0"/>
+                <a:cs typeface="Arial" pitchFamily="34" charset="0"/>
+              </a:rPr>
+              <a:t>Then</a:t>
+            </a:r>
+            <a:r>
+              <a:rPr lang="pt-BR" sz="1200" i="1" dirty="0">
+                <a:latin typeface="Arial" pitchFamily="34" charset="0"/>
+                <a:cs typeface="Arial" pitchFamily="34" charset="0"/>
+              </a:rPr>
+              <a:t> click </a:t>
+            </a:r>
+            <a:r>
+              <a:rPr lang="pt-BR" sz="1200" i="1" dirty="0" err="1">
+                <a:latin typeface="Arial" pitchFamily="34" charset="0"/>
+                <a:cs typeface="Arial" pitchFamily="34" charset="0"/>
+              </a:rPr>
+              <a:t>the</a:t>
+            </a:r>
+            <a:r>
+              <a:rPr lang="pt-BR" sz="1200" i="1" dirty="0">
+                <a:latin typeface="Arial" pitchFamily="34" charset="0"/>
+                <a:cs typeface="Arial" pitchFamily="34" charset="0"/>
+              </a:rPr>
+              <a:t> </a:t>
+            </a:r>
+            <a:r>
+              <a:rPr lang="pt-BR" sz="1200" i="1" dirty="0" err="1">
+                <a:latin typeface="Arial" pitchFamily="34" charset="0"/>
+                <a:cs typeface="Arial" pitchFamily="34" charset="0"/>
+              </a:rPr>
+              <a:t>Insert</a:t>
+            </a:r>
+            <a:r>
+              <a:rPr lang="pt-BR" sz="1200" i="1" dirty="0">
+                <a:latin typeface="Arial" pitchFamily="34" charset="0"/>
+                <a:cs typeface="Arial" pitchFamily="34" charset="0"/>
+              </a:rPr>
+              <a:t> Picture </a:t>
+            </a:r>
+            <a:r>
+              <a:rPr lang="pt-BR" sz="1200" i="1" dirty="0" err="1">
+                <a:latin typeface="Arial" pitchFamily="34" charset="0"/>
+                <a:cs typeface="Arial" pitchFamily="34" charset="0"/>
+              </a:rPr>
+              <a:t>icon</a:t>
+            </a:r>
+            <a:endParaRPr lang="pt-BR" sz="1200" i="1" dirty="0">
+              <a:latin typeface="Arial" pitchFamily="34" charset="0"/>
+              <a:cs typeface="Arial" pitchFamily="34" charset="0"/>
+            </a:endParaRPr>
+          </a:p>
+          <a:p>
+            <a:pPr rtl="0"/>
+            <a:r>
+              <a:rPr lang="pt-BR" sz="1200" i="1" dirty="0">
+                <a:latin typeface="Arial" pitchFamily="34" charset="0"/>
+                <a:cs typeface="Arial" pitchFamily="34" charset="0"/>
+              </a:rPr>
+              <a:t>in </a:t>
+            </a:r>
+            <a:r>
+              <a:rPr lang="pt-BR" sz="1200" i="1" dirty="0" err="1">
+                <a:latin typeface="Arial" pitchFamily="34" charset="0"/>
+                <a:cs typeface="Arial" pitchFamily="34" charset="0"/>
+              </a:rPr>
+              <a:t>the</a:t>
+            </a:r>
+            <a:r>
+              <a:rPr lang="pt-BR" sz="1200" i="1" dirty="0">
+                <a:latin typeface="Arial" pitchFamily="34" charset="0"/>
+                <a:cs typeface="Arial" pitchFamily="34" charset="0"/>
+              </a:rPr>
+              <a:t> </a:t>
+            </a:r>
+            <a:r>
+              <a:rPr lang="pt-BR" sz="1200" i="1" dirty="0" err="1">
+                <a:latin typeface="Arial" pitchFamily="34" charset="0"/>
+                <a:cs typeface="Arial" pitchFamily="34" charset="0"/>
+              </a:rPr>
+              <a:t>placeholder</a:t>
+            </a:r>
+            <a:r>
+              <a:rPr lang="pt-BR" sz="1200" i="1" dirty="0">
+                <a:latin typeface="Arial" pitchFamily="34" charset="0"/>
+                <a:cs typeface="Arial" pitchFamily="34" charset="0"/>
+              </a:rPr>
+              <a:t> </a:t>
+            </a:r>
+            <a:r>
+              <a:rPr lang="pt-BR" sz="1200" i="1" dirty="0" err="1">
+                <a:latin typeface="Arial" pitchFamily="34" charset="0"/>
+                <a:cs typeface="Arial" pitchFamily="34" charset="0"/>
+              </a:rPr>
+              <a:t>to</a:t>
+            </a:r>
+            <a:r>
+              <a:rPr lang="pt-BR" sz="1200" i="1" dirty="0">
+                <a:latin typeface="Arial" pitchFamily="34" charset="0"/>
+                <a:cs typeface="Arial" pitchFamily="34" charset="0"/>
+              </a:rPr>
+              <a:t> </a:t>
+            </a:r>
+            <a:r>
+              <a:rPr lang="pt-BR" sz="1200" i="1" dirty="0" err="1">
+                <a:latin typeface="Arial" pitchFamily="34" charset="0"/>
+                <a:cs typeface="Arial" pitchFamily="34" charset="0"/>
+              </a:rPr>
+              <a:t>insert</a:t>
+            </a:r>
+            <a:r>
+              <a:rPr lang="pt-BR" sz="1200" i="1" dirty="0">
+                <a:latin typeface="Arial" pitchFamily="34" charset="0"/>
+                <a:cs typeface="Arial" pitchFamily="34" charset="0"/>
+              </a:rPr>
+              <a:t> </a:t>
+            </a:r>
+            <a:r>
+              <a:rPr lang="pt-BR" sz="1200" i="1" dirty="0" err="1">
+                <a:latin typeface="Arial" pitchFamily="34" charset="0"/>
+                <a:cs typeface="Arial" pitchFamily="34" charset="0"/>
+              </a:rPr>
+              <a:t>your</a:t>
+            </a:r>
+            <a:r>
+              <a:rPr lang="pt-BR" sz="1200" i="1" dirty="0">
+                <a:latin typeface="Arial" pitchFamily="34" charset="0"/>
+                <a:cs typeface="Arial" pitchFamily="34" charset="0"/>
+              </a:rPr>
+              <a:t> </a:t>
+            </a:r>
+            <a:r>
+              <a:rPr lang="pt-BR" sz="1200" i="1" dirty="0" err="1">
+                <a:latin typeface="Arial" pitchFamily="34" charset="0"/>
+                <a:cs typeface="Arial" pitchFamily="34" charset="0"/>
+              </a:rPr>
+              <a:t>own</a:t>
+            </a:r>
+            <a:r>
+              <a:rPr lang="pt-BR" sz="1200" i="1" dirty="0">
+                <a:latin typeface="Arial" pitchFamily="34" charset="0"/>
+                <a:cs typeface="Arial" pitchFamily="34" charset="0"/>
+              </a:rPr>
+              <a:t> </a:t>
+            </a:r>
+            <a:r>
+              <a:rPr lang="pt-BR" sz="1200" i="1" dirty="0" err="1">
+                <a:latin typeface="Arial" pitchFamily="34" charset="0"/>
+                <a:cs typeface="Arial" pitchFamily="34" charset="0"/>
+              </a:rPr>
+              <a:t>image</a:t>
+            </a:r>
+            <a:r>
+              <a:rPr lang="pt-BR" sz="1200" i="1" dirty="0">
+                <a:latin typeface="Arial" pitchFamily="34" charset="0"/>
+                <a:cs typeface="Arial" pitchFamily="34" charset="0"/>
+              </a:rPr>
+              <a:t>.</a:t>
+            </a:r>
           </a:p>
         </p:txBody>
       </p:sp>
     </p:spTree>
     <p:extLst>
       <p:ext uri="{BB962C8B-B14F-4D97-AF65-F5344CB8AC3E}">
-        <p14:creationId xmlns:p14="http://schemas.microsoft.com/office/powerpoint/2010/main" val="2993111047"/>
+        <p14:creationId xmlns:p14="http://schemas.microsoft.com/office/powerpoint/2010/main" val="3053388791"/>
       </p:ext>
     </p:extLst>
   </p:cSld>
@@ -7597,6 +7812,15 @@
 </file>
 
 <file path=customXml/item1.xml><?xml version="1.0" encoding="utf-8"?>
+<?mso-contentType ?>
+<FormTemplates xmlns="http://schemas.microsoft.com/sharepoint/v3/contenttype/forms">
+  <Display>DocumentLibraryForm</Display>
+  <Edit>DocumentLibraryForm</Edit>
+  <New>DocumentLibraryForm</New>
+</FormTemplates>
+</file>
+
+<file path=customXml/item2.xml><?xml version="1.0" encoding="utf-8"?>
 <ct:contentTypeSchema xmlns:ct="http://schemas.microsoft.com/office/2006/metadata/contentType" xmlns:ma="http://schemas.microsoft.com/office/2006/metadata/properties/metaAttributes" ct:_="" ma:_="" ma:contentTypeName="Document" ma:contentTypeID="0x010100AA3F7D94069FF64A86F7DFF56D60E3BE" ma:contentTypeVersion="6" ma:contentTypeDescription="Create a new document." ma:contentTypeScope="" ma:versionID="c32302c77d4085ecf495bdddb7f5e889">
   <xsd:schema xmlns:xsd="http://www.w3.org/2001/XMLSchema" xmlns:xs="http://www.w3.org/2001/XMLSchema" xmlns:p="http://schemas.microsoft.com/office/2006/metadata/properties" xmlns:ns2="a4f35948-e619-41b3-aa29-22878b09cfd2" xmlns:ns3="40262f94-9f35-4ac3-9a90-690165a166b7" targetNamespace="http://schemas.microsoft.com/office/2006/metadata/properties" ma:root="true" ma:fieldsID="4ab5ae46be95f9d0be6107e8200be7a2" ns2:_="" ns3:_="">
     <xsd:import namespace="a4f35948-e619-41b3-aa29-22878b09cfd2"/>
@@ -7777,15 +8001,6 @@
 </ct:contentTypeSchema>
 </file>
 
-<file path=customXml/item2.xml><?xml version="1.0" encoding="utf-8"?>
-<?mso-contentType ?>
-<FormTemplates xmlns="http://schemas.microsoft.com/sharepoint/v3/contenttype/forms">
-  <Display>DocumentLibraryForm</Display>
-  <Edit>DocumentLibraryForm</Edit>
-  <New>DocumentLibraryForm</New>
-</FormTemplates>
-</file>
-
 <file path=customXml/item3.xml><?xml version="1.0" encoding="utf-8"?>
 <p:properties xmlns:p="http://schemas.microsoft.com/office/2006/metadata/properties" xmlns:xsi="http://www.w3.org/2001/XMLSchema-instance" xmlns:pc="http://schemas.microsoft.com/office/infopath/2007/PartnerControls">
   <documentManagement>
@@ -7798,6 +8013,14 @@
 </file>
 
 <file path=customXml/itemProps1.xml><?xml version="1.0" encoding="utf-8"?>
+<ds:datastoreItem xmlns:ds="http://schemas.openxmlformats.org/officeDocument/2006/customXml" ds:itemID="{48E42578-9CD4-4AFF-AA5E-F33052F6B6A6}">
+  <ds:schemaRefs>
+    <ds:schemaRef ds:uri="http://schemas.microsoft.com/sharepoint/v3/contenttype/forms"/>
+  </ds:schemaRefs>
+</ds:datastoreItem>
+</file>
+
+<file path=customXml/itemProps2.xml><?xml version="1.0" encoding="utf-8"?>
 <ds:datastoreItem xmlns:ds="http://schemas.openxmlformats.org/officeDocument/2006/customXml" ds:itemID="{5D30E8E9-C5F6-40D8-943C-DA5B4196A643}">
   <ds:schemaRefs>
     <ds:schemaRef ds:uri="http://schemas.microsoft.com/office/2006/metadata/contentType"/>
@@ -7812,14 +8035,6 @@
     <ds:schemaRef ds:uri="http://purl.org/dc/elements/1.1/"/>
     <ds:schemaRef ds:uri="http://purl.org/dc/terms/"/>
     <ds:schemaRef ds:uri="http://schemas.microsoft.com/internal/obd"/>
-  </ds:schemaRefs>
-</ds:datastoreItem>
-</file>
-
-<file path=customXml/itemProps2.xml><?xml version="1.0" encoding="utf-8"?>
-<ds:datastoreItem xmlns:ds="http://schemas.openxmlformats.org/officeDocument/2006/customXml" ds:itemID="{48E42578-9CD4-4AFF-AA5E-F33052F6B6A6}">
-  <ds:schemaRefs>
-    <ds:schemaRef ds:uri="http://schemas.microsoft.com/sharepoint/v3/contenttype/forms"/>
   </ds:schemaRefs>
 </ds:datastoreItem>
 </file>

</xml_diff>